<commit_message>
implemented game api endpoint for fantasy scoring
</commit_message>
<xml_diff>
--- a/doc/Tourdata Overview 3-23-2018.pptx
+++ b/doc/Tourdata Overview 3-23-2018.pptx
@@ -1225,7 +1225,7 @@
           <a:bodyPr/>
           <a:lstStyle/>
           <a:p>
-            <a:endParaRPr lang="en-US"/>
+            <a:endParaRPr lang="en-US" dirty="0"/>
           </a:p>
         </p:txBody>
       </p:sp>
@@ -5040,7 +5040,12 @@
             <p:ph type="title"/>
           </p:nvPr>
         </p:nvSpPr>
-        <p:spPr/>
+        <p:spPr>
+          <a:xfrm>
+            <a:off x="0" y="-51471"/>
+            <a:ext cx="10072688" cy="1247775"/>
+          </a:xfrm>
+        </p:spPr>
         <p:txBody>
           <a:bodyPr/>
           <a:lstStyle/>
@@ -5085,7 +5090,7 @@
         </p:nvSpPr>
         <p:spPr bwMode="auto">
           <a:xfrm>
-            <a:off x="468312" y="1417637"/>
+            <a:off x="468312" y="1948774"/>
             <a:ext cx="1295400" cy="609600"/>
           </a:xfrm>
           <a:prstGeom prst="rect">
@@ -5153,7 +5158,7 @@
         </p:nvSpPr>
         <p:spPr>
           <a:xfrm>
-            <a:off x="703078" y="1547453"/>
+            <a:off x="703078" y="2078590"/>
             <a:ext cx="825867" cy="349968"/>
           </a:xfrm>
           <a:prstGeom prst="rect">
@@ -5191,7 +5196,7 @@
         </p:nvSpPr>
         <p:spPr bwMode="auto">
           <a:xfrm>
-            <a:off x="1077912" y="2352674"/>
+            <a:off x="1077912" y="2883811"/>
             <a:ext cx="1562100" cy="609600"/>
           </a:xfrm>
           <a:prstGeom prst="rect">
@@ -5259,7 +5264,7 @@
         </p:nvSpPr>
         <p:spPr>
           <a:xfrm>
-            <a:off x="1312678" y="2482490"/>
+            <a:off x="1312678" y="3013627"/>
             <a:ext cx="1146468" cy="349968"/>
           </a:xfrm>
           <a:prstGeom prst="rect">
@@ -5297,7 +5302,7 @@
         </p:nvSpPr>
         <p:spPr bwMode="auto">
           <a:xfrm>
-            <a:off x="1097930" y="3157895"/>
+            <a:off x="1097930" y="3689032"/>
             <a:ext cx="1562100" cy="609600"/>
           </a:xfrm>
           <a:prstGeom prst="rect">
@@ -5365,7 +5370,7 @@
         </p:nvSpPr>
         <p:spPr>
           <a:xfrm>
-            <a:off x="1332696" y="3287711"/>
+            <a:off x="1332696" y="3818848"/>
             <a:ext cx="1082348" cy="349968"/>
           </a:xfrm>
           <a:prstGeom prst="rect">
@@ -5403,7 +5408,7 @@
         </p:nvSpPr>
         <p:spPr bwMode="auto">
           <a:xfrm>
-            <a:off x="1858962" y="4084637"/>
+            <a:off x="1858962" y="4615774"/>
             <a:ext cx="1562100" cy="609600"/>
           </a:xfrm>
           <a:prstGeom prst="rect">
@@ -5471,7 +5476,7 @@
         </p:nvSpPr>
         <p:spPr>
           <a:xfrm>
-            <a:off x="2093728" y="4214453"/>
+            <a:off x="2093728" y="4745590"/>
             <a:ext cx="1005403" cy="349968"/>
           </a:xfrm>
           <a:prstGeom prst="rect">
@@ -5509,7 +5514,7 @@
         </p:nvSpPr>
         <p:spPr bwMode="auto">
           <a:xfrm>
-            <a:off x="1878980" y="4889858"/>
+            <a:off x="1878980" y="5420995"/>
             <a:ext cx="1562100" cy="609600"/>
           </a:xfrm>
           <a:prstGeom prst="rect">
@@ -5577,7 +5582,7 @@
         </p:nvSpPr>
         <p:spPr>
           <a:xfrm>
-            <a:off x="2113746" y="5019674"/>
+            <a:off x="2113746" y="5550811"/>
             <a:ext cx="979755" cy="349968"/>
           </a:xfrm>
           <a:prstGeom prst="rect">
@@ -5615,7 +5620,7 @@
         </p:nvSpPr>
         <p:spPr>
           <a:xfrm>
-            <a:off x="5649912" y="4626300"/>
+            <a:off x="5626205" y="5389493"/>
             <a:ext cx="614271" cy="292709"/>
           </a:xfrm>
           <a:prstGeom prst="rect">
@@ -5653,7 +5658,7 @@
         </p:nvSpPr>
         <p:spPr bwMode="auto">
           <a:xfrm>
-            <a:off x="2687747" y="5806423"/>
+            <a:off x="2687747" y="6337560"/>
             <a:ext cx="1562100" cy="609600"/>
           </a:xfrm>
           <a:prstGeom prst="rect">
@@ -5715,51 +5720,13 @@
       </p:sp>
       <p:sp>
         <p:nvSpPr>
-          <p:cNvPr id="20" name="TextBox 19"/>
-          <p:cNvSpPr txBox="1"/>
-          <p:nvPr/>
-        </p:nvSpPr>
-        <p:spPr>
-          <a:xfrm>
-            <a:off x="2922513" y="5936239"/>
-            <a:ext cx="864339" cy="349968"/>
-          </a:xfrm>
-          <a:prstGeom prst="rect">
-            <a:avLst/>
-          </a:prstGeom>
-          <a:noFill/>
-        </p:spPr>
-        <p:txBody>
-          <a:bodyPr wrap="none" rtlCol="0">
-            <a:spAutoFit/>
-          </a:bodyPr>
-          <a:lstStyle/>
-          <a:p>
-            <a:r>
-              <a:rPr lang="en-US" dirty="0" smtClean="0">
-                <a:solidFill>
-                  <a:srgbClr val="000000"/>
-                </a:solidFill>
-              </a:rPr>
-              <a:t>Round</a:t>
-            </a:r>
-            <a:endParaRPr lang="en-US" dirty="0" smtClean="0">
-              <a:solidFill>
-                <a:srgbClr val="000000"/>
-              </a:solidFill>
-            </a:endParaRPr>
-          </a:p>
-        </p:txBody>
-      </p:sp>
-      <p:sp>
-        <p:nvSpPr>
           <p:cNvPr id="21" name="TextBox 20"/>
           <p:cNvSpPr txBox="1"/>
           <p:nvPr/>
         </p:nvSpPr>
         <p:spPr>
           <a:xfrm>
-            <a:off x="4317456" y="5806423"/>
+            <a:off x="4317456" y="6337560"/>
             <a:ext cx="811441" cy="292709"/>
           </a:xfrm>
           <a:prstGeom prst="rect">
@@ -5797,7 +5764,7 @@
         </p:nvSpPr>
         <p:spPr>
           <a:xfrm>
-            <a:off x="4317455" y="6156391"/>
+            <a:off x="4317455" y="6687528"/>
             <a:ext cx="1040157" cy="292709"/>
           </a:xfrm>
           <a:prstGeom prst="rect">
@@ -5945,7 +5912,7 @@
         </p:nvCxnSpPr>
         <p:spPr bwMode="auto">
           <a:xfrm rot="16200000" flipH="1">
-            <a:off x="534194" y="2113755"/>
+            <a:off x="534194" y="2644892"/>
             <a:ext cx="630237" cy="457200"/>
           </a:xfrm>
           <a:prstGeom prst="bentConnector2">
@@ -5976,7 +5943,7 @@
         </p:nvCxnSpPr>
         <p:spPr bwMode="auto">
           <a:xfrm rot="16200000" flipH="1">
-            <a:off x="147238" y="2512003"/>
+            <a:off x="147238" y="3043140"/>
             <a:ext cx="1424166" cy="477217"/>
           </a:xfrm>
           <a:prstGeom prst="bentConnector2">
@@ -6005,7 +5972,7 @@
         </p:nvCxnSpPr>
         <p:spPr bwMode="auto">
           <a:xfrm rot="16200000" flipH="1">
-            <a:off x="1311895" y="3891490"/>
+            <a:off x="1311895" y="4422627"/>
             <a:ext cx="630237" cy="457200"/>
           </a:xfrm>
           <a:prstGeom prst="bentConnector2">
@@ -6034,7 +6001,7 @@
         </p:nvCxnSpPr>
         <p:spPr bwMode="auto">
           <a:xfrm rot="16200000" flipH="1">
-            <a:off x="924939" y="4289738"/>
+            <a:off x="924939" y="4820875"/>
             <a:ext cx="1424166" cy="477217"/>
           </a:xfrm>
           <a:prstGeom prst="bentConnector2">
@@ -6063,7 +6030,7 @@
         </p:nvSpPr>
         <p:spPr bwMode="auto">
           <a:xfrm>
-            <a:off x="3183106" y="2890282"/>
+            <a:off x="3183106" y="3421419"/>
             <a:ext cx="1562100" cy="609600"/>
           </a:xfrm>
           <a:prstGeom prst="rect">
@@ -6131,7 +6098,7 @@
         </p:nvSpPr>
         <p:spPr>
           <a:xfrm>
-            <a:off x="3417872" y="3020098"/>
+            <a:off x="3417872" y="3551235"/>
             <a:ext cx="1031051" cy="349968"/>
           </a:xfrm>
           <a:prstGeom prst="rect">
@@ -6171,7 +6138,7 @@
         </p:nvCxnSpPr>
         <p:spPr bwMode="auto">
           <a:xfrm>
-            <a:off x="2640012" y="2657474"/>
+            <a:off x="2640012" y="3188611"/>
             <a:ext cx="554100" cy="481714"/>
           </a:xfrm>
           <a:prstGeom prst="bentConnector3">
@@ -6202,7 +6169,7 @@
         </p:nvSpPr>
         <p:spPr>
           <a:xfrm>
-            <a:off x="4811712" y="2890282"/>
+            <a:off x="1776974" y="1205877"/>
             <a:ext cx="633507" cy="292709"/>
           </a:xfrm>
           <a:prstGeom prst="rect">
@@ -6217,7 +6184,7 @@
           <a:lstStyle/>
           <a:p>
             <a:r>
-              <a:rPr lang="en-US" sz="1400" smtClean="0">
+              <a:rPr lang="en-US" sz="1400" dirty="0" smtClean="0">
                 <a:solidFill>
                   <a:srgbClr val="000000"/>
                 </a:solidFill>
@@ -6240,7 +6207,7 @@
         </p:nvSpPr>
         <p:spPr>
           <a:xfrm>
-            <a:off x="4811712" y="3240250"/>
+            <a:off x="1776974" y="1555845"/>
             <a:ext cx="971741" cy="292709"/>
           </a:xfrm>
           <a:prstGeom prst="rect">
@@ -6278,7 +6245,7 @@
         </p:nvSpPr>
         <p:spPr bwMode="auto">
           <a:xfrm>
-            <a:off x="4004144" y="4614209"/>
+            <a:off x="4004144" y="5145346"/>
             <a:ext cx="1562100" cy="609600"/>
           </a:xfrm>
           <a:prstGeom prst="rect">
@@ -6346,7 +6313,7 @@
         </p:nvSpPr>
         <p:spPr>
           <a:xfrm>
-            <a:off x="4238910" y="4744025"/>
+            <a:off x="4238910" y="5275162"/>
             <a:ext cx="889987" cy="349968"/>
           </a:xfrm>
           <a:prstGeom prst="rect">
@@ -6384,7 +6351,7 @@
         </p:nvCxnSpPr>
         <p:spPr bwMode="auto">
           <a:xfrm>
-            <a:off x="3461050" y="4381401"/>
+            <a:off x="3461050" y="4912538"/>
             <a:ext cx="554100" cy="481714"/>
           </a:xfrm>
           <a:prstGeom prst="bentConnector3">
@@ -6415,7 +6382,7 @@
         </p:nvCxnSpPr>
         <p:spPr bwMode="auto">
           <a:xfrm rot="16200000" flipH="1">
-            <a:off x="2144028" y="5578848"/>
+            <a:off x="2144028" y="6109985"/>
             <a:ext cx="630237" cy="457200"/>
           </a:xfrm>
           <a:prstGeom prst="bentConnector2">
@@ -6444,12 +6411,12 @@
         </p:nvCxnSpPr>
         <p:spPr bwMode="auto">
           <a:xfrm>
-            <a:off x="4811712" y="6703603"/>
-            <a:ext cx="2250985" cy="328113"/>
+            <a:off x="3592512" y="6833419"/>
+            <a:ext cx="3470185" cy="327411"/>
           </a:xfrm>
           <a:prstGeom prst="bentConnector3">
             <a:avLst>
-              <a:gd name="adj1" fmla="val -646"/>
+              <a:gd name="adj1" fmla="val 2"/>
             </a:avLst>
           </a:prstGeom>
           <a:solidFill>
@@ -6460,6 +6427,391 @@
               <a:schemeClr val="tx1"/>
             </a:solidFill>
             <a:prstDash val="dash"/>
+            <a:round/>
+            <a:headEnd type="none" w="med" len="med"/>
+            <a:tailEnd type="triangle"/>
+          </a:ln>
+          <a:effectLst/>
+        </p:spPr>
+      </p:cxnSp>
+      <p:sp>
+        <p:nvSpPr>
+          <p:cNvPr id="45" name="Rectangle 44"/>
+          <p:cNvSpPr/>
+          <p:nvPr/>
+        </p:nvSpPr>
+        <p:spPr bwMode="auto">
+          <a:xfrm>
+            <a:off x="450230" y="1190011"/>
+            <a:ext cx="1295400" cy="609600"/>
+          </a:xfrm>
+          <a:prstGeom prst="rect">
+            <a:avLst/>
+          </a:prstGeom>
+          <a:solidFill>
+            <a:srgbClr val="00B8FF"/>
+          </a:solidFill>
+          <a:ln w="9525" cap="flat" cmpd="sng" algn="ctr">
+            <a:solidFill>
+              <a:schemeClr val="tx1"/>
+            </a:solidFill>
+            <a:prstDash val="solid"/>
+            <a:round/>
+            <a:headEnd type="none" w="med" len="med"/>
+            <a:tailEnd type="none" w="med" len="med"/>
+          </a:ln>
+          <a:effectLst/>
+        </p:spPr>
+        <p:txBody>
+          <a:bodyPr vert="horz" wrap="square" lIns="91440" tIns="45720" rIns="91440" bIns="45720" numCol="1" rtlCol="0" anchor="t" anchorCtr="0" compatLnSpc="1">
+            <a:prstTxWarp prst="textNoShape">
+              <a:avLst/>
+            </a:prstTxWarp>
+          </a:bodyPr>
+          <a:lstStyle/>
+          <a:p>
+            <a:pPr marL="0" marR="0" indent="0" algn="l" defTabSz="457200" rtl="0" eaLnBrk="1" fontAlgn="base" latinLnBrk="0" hangingPunct="0">
+              <a:lnSpc>
+                <a:spcPct val="93000"/>
+              </a:lnSpc>
+              <a:spcBef>
+                <a:spcPct val="0"/>
+              </a:spcBef>
+              <a:spcAft>
+                <a:spcPct val="0"/>
+              </a:spcAft>
+              <a:buClr>
+                <a:srgbClr val="000000"/>
+              </a:buClr>
+              <a:buSzPct val="100000"/>
+              <a:buFont typeface="Times New Roman" pitchFamily="18" charset="0"/>
+              <a:buNone/>
+              <a:tabLst/>
+            </a:pPr>
+            <a:endParaRPr kumimoji="0" lang="en-US" sz="1800" b="0" i="0" u="none" strike="noStrike" cap="none" normalizeH="0" baseline="0" smtClean="0">
+              <a:ln>
+                <a:noFill/>
+              </a:ln>
+              <a:solidFill>
+                <a:schemeClr val="bg1"/>
+              </a:solidFill>
+              <a:effectLst/>
+              <a:latin typeface="Arial" pitchFamily="34" charset="0"/>
+              <a:ea typeface="Microsoft YaHei" pitchFamily="34" charset="-122"/>
+            </a:endParaRPr>
+          </a:p>
+        </p:txBody>
+      </p:sp>
+      <p:sp>
+        <p:nvSpPr>
+          <p:cNvPr id="46" name="TextBox 45"/>
+          <p:cNvSpPr txBox="1"/>
+          <p:nvPr/>
+        </p:nvSpPr>
+        <p:spPr>
+          <a:xfrm>
+            <a:off x="684996" y="1319827"/>
+            <a:ext cx="787395" cy="349968"/>
+          </a:xfrm>
+          <a:prstGeom prst="rect">
+            <a:avLst/>
+          </a:prstGeom>
+          <a:noFill/>
+        </p:spPr>
+        <p:txBody>
+          <a:bodyPr wrap="none" rtlCol="0">
+            <a:spAutoFit/>
+          </a:bodyPr>
+          <a:lstStyle/>
+          <a:p>
+            <a:r>
+              <a:rPr lang="en-US" dirty="0" smtClean="0">
+                <a:solidFill>
+                  <a:srgbClr val="000000"/>
+                </a:solidFill>
+              </a:rPr>
+              <a:t>Users</a:t>
+            </a:r>
+            <a:endParaRPr lang="en-US" dirty="0" smtClean="0">
+              <a:solidFill>
+                <a:srgbClr val="000000"/>
+              </a:solidFill>
+            </a:endParaRPr>
+          </a:p>
+        </p:txBody>
+      </p:sp>
+      <p:sp>
+        <p:nvSpPr>
+          <p:cNvPr id="20" name="TextBox 19"/>
+          <p:cNvSpPr txBox="1"/>
+          <p:nvPr/>
+        </p:nvSpPr>
+        <p:spPr>
+          <a:xfrm>
+            <a:off x="2922513" y="6467376"/>
+            <a:ext cx="864339" cy="349968"/>
+          </a:xfrm>
+          <a:prstGeom prst="rect">
+            <a:avLst/>
+          </a:prstGeom>
+          <a:noFill/>
+        </p:spPr>
+        <p:txBody>
+          <a:bodyPr wrap="none" rtlCol="0">
+            <a:spAutoFit/>
+          </a:bodyPr>
+          <a:lstStyle/>
+          <a:p>
+            <a:r>
+              <a:rPr lang="en-US" dirty="0" smtClean="0">
+                <a:solidFill>
+                  <a:srgbClr val="000000"/>
+                </a:solidFill>
+              </a:rPr>
+              <a:t>Round</a:t>
+            </a:r>
+            <a:endParaRPr lang="en-US" dirty="0" smtClean="0">
+              <a:solidFill>
+                <a:srgbClr val="000000"/>
+              </a:solidFill>
+            </a:endParaRPr>
+          </a:p>
+        </p:txBody>
+      </p:sp>
+      <p:cxnSp>
+        <p:nvCxnSpPr>
+          <p:cNvPr id="50" name="Elbow Connector 49"/>
+          <p:cNvCxnSpPr>
+            <a:endCxn id="45" idx="3"/>
+          </p:cNvCxnSpPr>
+          <p:nvPr/>
+        </p:nvCxnSpPr>
+        <p:spPr bwMode="auto">
+          <a:xfrm rot="10800000">
+            <a:off x="1745630" y="1494811"/>
+            <a:ext cx="2380282" cy="1904026"/>
+          </a:xfrm>
+          <a:prstGeom prst="bentConnector3">
+            <a:avLst>
+              <a:gd name="adj1" fmla="val -1221"/>
+            </a:avLst>
+          </a:prstGeom>
+          <a:solidFill>
+            <a:srgbClr val="00B8FF"/>
+          </a:solidFill>
+          <a:ln w="9525" cap="flat" cmpd="sng" algn="ctr">
+            <a:solidFill>
+              <a:schemeClr val="tx1"/>
+            </a:solidFill>
+            <a:prstDash val="dash"/>
+            <a:round/>
+            <a:headEnd type="none" w="med" len="med"/>
+            <a:tailEnd type="triangle"/>
+          </a:ln>
+          <a:effectLst/>
+        </p:spPr>
+      </p:cxnSp>
+      <p:cxnSp>
+        <p:nvCxnSpPr>
+          <p:cNvPr id="54" name="Elbow Connector 53"/>
+          <p:cNvCxnSpPr/>
+          <p:nvPr/>
+        </p:nvCxnSpPr>
+        <p:spPr bwMode="auto">
+          <a:xfrm rot="16200000" flipV="1">
+            <a:off x="4237307" y="4196246"/>
+            <a:ext cx="1449270" cy="433471"/>
+          </a:xfrm>
+          <a:prstGeom prst="bentConnector3">
+            <a:avLst>
+              <a:gd name="adj1" fmla="val 99342"/>
+            </a:avLst>
+          </a:prstGeom>
+          <a:solidFill>
+            <a:srgbClr val="00B8FF"/>
+          </a:solidFill>
+          <a:ln w="9525" cap="flat" cmpd="sng" algn="ctr">
+            <a:solidFill>
+              <a:schemeClr val="tx1"/>
+            </a:solidFill>
+            <a:prstDash val="dash"/>
+            <a:round/>
+            <a:headEnd type="none" w="med" len="med"/>
+            <a:tailEnd type="triangle"/>
+          </a:ln>
+          <a:effectLst/>
+        </p:spPr>
+      </p:cxnSp>
+      <p:sp>
+        <p:nvSpPr>
+          <p:cNvPr id="57" name="TextBox 56"/>
+          <p:cNvSpPr txBox="1"/>
+          <p:nvPr/>
+        </p:nvSpPr>
+        <p:spPr>
+          <a:xfrm>
+            <a:off x="4812143" y="3398838"/>
+            <a:ext cx="692818" cy="292709"/>
+          </a:xfrm>
+          <a:prstGeom prst="rect">
+            <a:avLst/>
+          </a:prstGeom>
+          <a:noFill/>
+        </p:spPr>
+        <p:txBody>
+          <a:bodyPr wrap="none" rtlCol="0">
+            <a:spAutoFit/>
+          </a:bodyPr>
+          <a:lstStyle/>
+          <a:p>
+            <a:r>
+              <a:rPr lang="en-US" sz="1400" dirty="0" smtClean="0">
+                <a:solidFill>
+                  <a:srgbClr val="000000"/>
+                </a:solidFill>
+              </a:rPr>
+              <a:t>Admin</a:t>
+            </a:r>
+            <a:endParaRPr lang="en-US" sz="1400" dirty="0" smtClean="0">
+              <a:solidFill>
+                <a:srgbClr val="000000"/>
+              </a:solidFill>
+            </a:endParaRPr>
+          </a:p>
+        </p:txBody>
+      </p:sp>
+      <p:sp>
+        <p:nvSpPr>
+          <p:cNvPr id="58" name="Rectangle 57"/>
+          <p:cNvSpPr/>
+          <p:nvPr/>
+        </p:nvSpPr>
+        <p:spPr bwMode="auto">
+          <a:xfrm>
+            <a:off x="6392862" y="4334246"/>
+            <a:ext cx="1562100" cy="609600"/>
+          </a:xfrm>
+          <a:prstGeom prst="rect">
+            <a:avLst/>
+          </a:prstGeom>
+          <a:solidFill>
+            <a:srgbClr val="00B8FF"/>
+          </a:solidFill>
+          <a:ln w="9525" cap="flat" cmpd="sng" algn="ctr">
+            <a:solidFill>
+              <a:schemeClr val="tx1"/>
+            </a:solidFill>
+            <a:prstDash val="solid"/>
+            <a:round/>
+            <a:headEnd type="none" w="med" len="med"/>
+            <a:tailEnd type="none" w="med" len="med"/>
+          </a:ln>
+          <a:effectLst/>
+        </p:spPr>
+        <p:txBody>
+          <a:bodyPr vert="horz" wrap="square" lIns="91440" tIns="45720" rIns="91440" bIns="45720" numCol="1" rtlCol="0" anchor="t" anchorCtr="0" compatLnSpc="1">
+            <a:prstTxWarp prst="textNoShape">
+              <a:avLst/>
+            </a:prstTxWarp>
+          </a:bodyPr>
+          <a:lstStyle/>
+          <a:p>
+            <a:pPr marL="0" marR="0" indent="0" algn="l" defTabSz="457200" rtl="0" eaLnBrk="1" fontAlgn="base" latinLnBrk="0" hangingPunct="0">
+              <a:lnSpc>
+                <a:spcPct val="93000"/>
+              </a:lnSpc>
+              <a:spcBef>
+                <a:spcPct val="0"/>
+              </a:spcBef>
+              <a:spcAft>
+                <a:spcPct val="0"/>
+              </a:spcAft>
+              <a:buClr>
+                <a:srgbClr val="000000"/>
+              </a:buClr>
+              <a:buSzPct val="100000"/>
+              <a:buFont typeface="Times New Roman" pitchFamily="18" charset="0"/>
+              <a:buNone/>
+              <a:tabLst/>
+            </a:pPr>
+            <a:endParaRPr kumimoji="0" lang="en-US" sz="1800" b="0" i="0" u="none" strike="noStrike" cap="none" normalizeH="0" baseline="0" smtClean="0">
+              <a:ln>
+                <a:noFill/>
+              </a:ln>
+              <a:solidFill>
+                <a:schemeClr val="bg1"/>
+              </a:solidFill>
+              <a:effectLst/>
+              <a:latin typeface="Arial" pitchFamily="34" charset="0"/>
+              <a:ea typeface="Microsoft YaHei" pitchFamily="34" charset="-122"/>
+            </a:endParaRPr>
+          </a:p>
+        </p:txBody>
+      </p:sp>
+      <p:sp>
+        <p:nvSpPr>
+          <p:cNvPr id="59" name="TextBox 58"/>
+          <p:cNvSpPr txBox="1"/>
+          <p:nvPr/>
+        </p:nvSpPr>
+        <p:spPr>
+          <a:xfrm>
+            <a:off x="6627628" y="4464062"/>
+            <a:ext cx="864339" cy="349968"/>
+          </a:xfrm>
+          <a:prstGeom prst="rect">
+            <a:avLst/>
+          </a:prstGeom>
+          <a:noFill/>
+        </p:spPr>
+        <p:txBody>
+          <a:bodyPr wrap="none" rtlCol="0">
+            <a:spAutoFit/>
+          </a:bodyPr>
+          <a:lstStyle/>
+          <a:p>
+            <a:r>
+              <a:rPr lang="en-US" dirty="0" smtClean="0">
+                <a:solidFill>
+                  <a:srgbClr val="000000"/>
+                </a:solidFill>
+              </a:rPr>
+              <a:t>Roster</a:t>
+            </a:r>
+            <a:endParaRPr lang="en-US" dirty="0" smtClean="0">
+              <a:solidFill>
+                <a:srgbClr val="000000"/>
+              </a:solidFill>
+            </a:endParaRPr>
+          </a:p>
+        </p:txBody>
+      </p:sp>
+      <p:cxnSp>
+        <p:nvCxnSpPr>
+          <p:cNvPr id="61" name="Elbow Connector 60"/>
+          <p:cNvCxnSpPr>
+            <a:endCxn id="58" idx="1"/>
+          </p:cNvCxnSpPr>
+          <p:nvPr/>
+        </p:nvCxnSpPr>
+        <p:spPr bwMode="auto">
+          <a:xfrm flipV="1">
+            <a:off x="5592897" y="4639046"/>
+            <a:ext cx="799965" cy="670908"/>
+          </a:xfrm>
+          <a:prstGeom prst="bentConnector3">
+            <a:avLst>
+              <a:gd name="adj1" fmla="val 57327"/>
+            </a:avLst>
+          </a:prstGeom>
+          <a:solidFill>
+            <a:srgbClr val="00B8FF"/>
+          </a:solidFill>
+          <a:ln w="9525" cap="flat" cmpd="sng" algn="ctr">
+            <a:solidFill>
+              <a:schemeClr val="tx1"/>
+            </a:solidFill>
+            <a:prstDash val="solid"/>
             <a:round/>
             <a:headEnd type="none" w="med" len="med"/>
             <a:tailEnd type="triangle"/>

</xml_diff>